<commit_message>
Update BI_ML_Presentation PART I & II.pptx
</commit_message>
<xml_diff>
--- a/Chinook_Presentation/BI_ML_Presentation PART I & II.pptx
+++ b/Chinook_Presentation/BI_ML_Presentation PART I & II.pptx
@@ -8,23 +8,26 @@
     <p:sldMasterId id="2147483686" r:id="rId4"/>
   </p:sldMasterIdLst>
   <p:notesMasterIdLst>
-    <p:notesMasterId r:id="rId19"/>
+    <p:notesMasterId r:id="rId22"/>
   </p:notesMasterIdLst>
   <p:sldIdLst>
     <p:sldId id="257" r:id="rId5"/>
-    <p:sldId id="261" r:id="rId6"/>
-    <p:sldId id="262" r:id="rId7"/>
-    <p:sldId id="264" r:id="rId8"/>
-    <p:sldId id="265" r:id="rId9"/>
-    <p:sldId id="266" r:id="rId10"/>
-    <p:sldId id="263" r:id="rId11"/>
-    <p:sldId id="267" r:id="rId12"/>
-    <p:sldId id="268" r:id="rId13"/>
-    <p:sldId id="269" r:id="rId14"/>
-    <p:sldId id="270" r:id="rId15"/>
-    <p:sldId id="271" r:id="rId16"/>
-    <p:sldId id="272" r:id="rId17"/>
-    <p:sldId id="258" r:id="rId18"/>
+    <p:sldId id="273" r:id="rId6"/>
+    <p:sldId id="261" r:id="rId7"/>
+    <p:sldId id="262" r:id="rId8"/>
+    <p:sldId id="264" r:id="rId9"/>
+    <p:sldId id="274" r:id="rId10"/>
+    <p:sldId id="275" r:id="rId11"/>
+    <p:sldId id="276" r:id="rId12"/>
+    <p:sldId id="277" r:id="rId13"/>
+    <p:sldId id="266" r:id="rId14"/>
+    <p:sldId id="263" r:id="rId15"/>
+    <p:sldId id="267" r:id="rId16"/>
+    <p:sldId id="268" r:id="rId17"/>
+    <p:sldId id="278" r:id="rId18"/>
+    <p:sldId id="269" r:id="rId19"/>
+    <p:sldId id="270" r:id="rId20"/>
+    <p:sldId id="258" r:id="rId21"/>
   </p:sldIdLst>
   <p:sldSz cx="12192000" cy="6858000"/>
   <p:notesSz cx="6858000" cy="9144000"/>
@@ -213,7 +216,7 @@
           <a:p>
             <a:fld id="{C979F42B-8ED5-4DFD-BB43-C98FFCE84338}" type="datetimeFigureOut">
               <a:rPr lang="en-US" smtClean="0"/>
-              <a:t>1/18/2025</a:t>
+              <a:t>1/19/2025</a:t>
             </a:fld>
             <a:endParaRPr lang="en-US"/>
           </a:p>
@@ -769,7 +772,7 @@
           <a:p>
             <a:fld id="{7B38173E-2647-4277-8394-8E7FAFA72EB8}" type="datetimeFigureOut">
               <a:rPr lang="en-US" smtClean="0"/>
-              <a:t>1/18/2025</a:t>
+              <a:t>1/19/2025</a:t>
             </a:fld>
             <a:endParaRPr lang="en-US"/>
           </a:p>
@@ -1004,7 +1007,7 @@
           <a:p>
             <a:fld id="{7B38173E-2647-4277-8394-8E7FAFA72EB8}" type="datetimeFigureOut">
               <a:rPr lang="en-US" smtClean="0"/>
-              <a:t>1/18/2025</a:t>
+              <a:t>1/19/2025</a:t>
             </a:fld>
             <a:endParaRPr lang="en-US"/>
           </a:p>
@@ -1169,7 +1172,7 @@
           <a:p>
             <a:fld id="{7B38173E-2647-4277-8394-8E7FAFA72EB8}" type="datetimeFigureOut">
               <a:rPr lang="en-US" smtClean="0"/>
-              <a:t>1/18/2025</a:t>
+              <a:t>1/19/2025</a:t>
             </a:fld>
             <a:endParaRPr lang="en-US"/>
           </a:p>
@@ -1614,7 +1617,7 @@
           <a:p>
             <a:fld id="{6D3CD741-2E3C-46BC-BD4F-513FEA5EC99E}" type="datetimeFigureOut">
               <a:rPr lang="en-US" smtClean="0"/>
-              <a:t>1/18/2025</a:t>
+              <a:t>1/19/2025</a:t>
             </a:fld>
             <a:endParaRPr lang="en-US"/>
           </a:p>
@@ -1895,7 +1898,7 @@
           <a:p>
             <a:fld id="{6D3CD741-2E3C-46BC-BD4F-513FEA5EC99E}" type="datetimeFigureOut">
               <a:rPr lang="en-US" smtClean="0"/>
-              <a:t>1/18/2025</a:t>
+              <a:t>1/19/2025</a:t>
             </a:fld>
             <a:endParaRPr lang="en-US"/>
           </a:p>
@@ -2174,7 +2177,7 @@
           <a:p>
             <a:fld id="{6D3CD741-2E3C-46BC-BD4F-513FEA5EC99E}" type="datetimeFigureOut">
               <a:rPr lang="en-US" smtClean="0"/>
-              <a:t>1/18/2025</a:t>
+              <a:t>1/19/2025</a:t>
             </a:fld>
             <a:endParaRPr lang="en-US"/>
           </a:p>
@@ -2601,7 +2604,7 @@
           <a:p>
             <a:fld id="{6D3CD741-2E3C-46BC-BD4F-513FEA5EC99E}" type="datetimeFigureOut">
               <a:rPr lang="en-US" smtClean="0"/>
-              <a:t>1/18/2025</a:t>
+              <a:t>1/19/2025</a:t>
             </a:fld>
             <a:endParaRPr lang="en-US"/>
           </a:p>
@@ -2750,7 +2753,7 @@
           <a:p>
             <a:fld id="{6D3CD741-2E3C-46BC-BD4F-513FEA5EC99E}" type="datetimeFigureOut">
               <a:rPr lang="en-US" smtClean="0"/>
-              <a:t>1/18/2025</a:t>
+              <a:t>1/19/2025</a:t>
             </a:fld>
             <a:endParaRPr lang="en-US"/>
           </a:p>
@@ -2863,7 +2866,7 @@
           <a:p>
             <a:fld id="{6D3CD741-2E3C-46BC-BD4F-513FEA5EC99E}" type="datetimeFigureOut">
               <a:rPr lang="en-US" smtClean="0"/>
-              <a:t>1/18/2025</a:t>
+              <a:t>1/19/2025</a:t>
             </a:fld>
             <a:endParaRPr lang="en-US"/>
           </a:p>
@@ -3077,7 +3080,7 @@
           <a:p>
             <a:fld id="{7B38173E-2647-4277-8394-8E7FAFA72EB8}" type="datetimeFigureOut">
               <a:rPr lang="en-US" smtClean="0"/>
-              <a:t>1/18/2025</a:t>
+              <a:t>1/19/2025</a:t>
             </a:fld>
             <a:endParaRPr lang="en-US"/>
           </a:p>
@@ -3413,7 +3416,7 @@
           <a:p>
             <a:fld id="{6D3CD741-2E3C-46BC-BD4F-513FEA5EC99E}" type="datetimeFigureOut">
               <a:rPr lang="en-US" smtClean="0"/>
-              <a:t>1/18/2025</a:t>
+              <a:t>1/19/2025</a:t>
             </a:fld>
             <a:endParaRPr lang="en-US"/>
           </a:p>
@@ -3710,7 +3713,7 @@
           <a:p>
             <a:fld id="{6D3CD741-2E3C-46BC-BD4F-513FEA5EC99E}" type="datetimeFigureOut">
               <a:rPr lang="en-US" smtClean="0"/>
-              <a:t>1/18/2025</a:t>
+              <a:t>1/19/2025</a:t>
             </a:fld>
             <a:endParaRPr lang="en-US"/>
           </a:p>
@@ -3924,7 +3927,7 @@
           <a:p>
             <a:fld id="{6D3CD741-2E3C-46BC-BD4F-513FEA5EC99E}" type="datetimeFigureOut">
               <a:rPr lang="en-US" smtClean="0"/>
-              <a:t>1/18/2025</a:t>
+              <a:t>1/19/2025</a:t>
             </a:fld>
             <a:endParaRPr lang="en-US"/>
           </a:p>
@@ -4138,7 +4141,7 @@
           <a:p>
             <a:fld id="{6D3CD741-2E3C-46BC-BD4F-513FEA5EC99E}" type="datetimeFigureOut">
               <a:rPr lang="en-US" smtClean="0"/>
-              <a:t>1/18/2025</a:t>
+              <a:t>1/19/2025</a:t>
             </a:fld>
             <a:endParaRPr lang="en-US"/>
           </a:p>
@@ -4358,7 +4361,7 @@
           <a:p>
             <a:fld id="{0897D7FB-8BED-4034-AF5C-6E1B4BE46DFA}" type="datetimeFigureOut">
               <a:rPr lang="en-US" smtClean="0"/>
-              <a:t>1/18/2025</a:t>
+              <a:t>1/19/2025</a:t>
             </a:fld>
             <a:endParaRPr lang="en-US"/>
           </a:p>
@@ -4556,7 +4559,7 @@
           <a:p>
             <a:fld id="{0897D7FB-8BED-4034-AF5C-6E1B4BE46DFA}" type="datetimeFigureOut">
               <a:rPr lang="en-US" smtClean="0"/>
-              <a:t>1/18/2025</a:t>
+              <a:t>1/19/2025</a:t>
             </a:fld>
             <a:endParaRPr lang="en-US"/>
           </a:p>
@@ -4831,7 +4834,7 @@
           <a:p>
             <a:fld id="{0897D7FB-8BED-4034-AF5C-6E1B4BE46DFA}" type="datetimeFigureOut">
               <a:rPr lang="en-US" smtClean="0"/>
-              <a:t>1/18/2025</a:t>
+              <a:t>1/19/2025</a:t>
             </a:fld>
             <a:endParaRPr lang="en-US"/>
           </a:p>
@@ -5096,7 +5099,7 @@
           <a:p>
             <a:fld id="{0897D7FB-8BED-4034-AF5C-6E1B4BE46DFA}" type="datetimeFigureOut">
               <a:rPr lang="en-US" smtClean="0"/>
-              <a:t>1/18/2025</a:t>
+              <a:t>1/19/2025</a:t>
             </a:fld>
             <a:endParaRPr lang="en-US"/>
           </a:p>
@@ -5508,7 +5511,7 @@
           <a:p>
             <a:fld id="{0897D7FB-8BED-4034-AF5C-6E1B4BE46DFA}" type="datetimeFigureOut">
               <a:rPr lang="en-US" smtClean="0"/>
-              <a:t>1/18/2025</a:t>
+              <a:t>1/19/2025</a:t>
             </a:fld>
             <a:endParaRPr lang="en-US"/>
           </a:p>
@@ -5649,7 +5652,7 @@
           <a:p>
             <a:fld id="{0897D7FB-8BED-4034-AF5C-6E1B4BE46DFA}" type="datetimeFigureOut">
               <a:rPr lang="en-US" smtClean="0"/>
-              <a:t>1/18/2025</a:t>
+              <a:t>1/19/2025</a:t>
             </a:fld>
             <a:endParaRPr lang="en-US"/>
           </a:p>
@@ -5935,7 +5938,7 @@
           <a:p>
             <a:fld id="{7B38173E-2647-4277-8394-8E7FAFA72EB8}" type="datetimeFigureOut">
               <a:rPr lang="en-US" smtClean="0"/>
-              <a:t>1/18/2025</a:t>
+              <a:t>1/19/2025</a:t>
             </a:fld>
             <a:endParaRPr lang="en-US"/>
           </a:p>
@@ -6064,7 +6067,7 @@
           <a:p>
             <a:fld id="{0897D7FB-8BED-4034-AF5C-6E1B4BE46DFA}" type="datetimeFigureOut">
               <a:rPr lang="en-US" smtClean="0"/>
-              <a:t>1/18/2025</a:t>
+              <a:t>1/19/2025</a:t>
             </a:fld>
             <a:endParaRPr lang="en-US"/>
           </a:p>
@@ -6375,7 +6378,7 @@
           <a:p>
             <a:fld id="{0897D7FB-8BED-4034-AF5C-6E1B4BE46DFA}" type="datetimeFigureOut">
               <a:rPr lang="en-US" smtClean="0"/>
-              <a:t>1/18/2025</a:t>
+              <a:t>1/19/2025</a:t>
             </a:fld>
             <a:endParaRPr lang="en-US"/>
           </a:p>
@@ -6663,7 +6666,7 @@
           <a:p>
             <a:fld id="{0897D7FB-8BED-4034-AF5C-6E1B4BE46DFA}" type="datetimeFigureOut">
               <a:rPr lang="en-US" smtClean="0"/>
-              <a:t>1/18/2025</a:t>
+              <a:t>1/19/2025</a:t>
             </a:fld>
             <a:endParaRPr lang="en-US"/>
           </a:p>
@@ -6861,7 +6864,7 @@
           <a:p>
             <a:fld id="{0897D7FB-8BED-4034-AF5C-6E1B4BE46DFA}" type="datetimeFigureOut">
               <a:rPr lang="en-US" smtClean="0"/>
-              <a:t>1/18/2025</a:t>
+              <a:t>1/19/2025</a:t>
             </a:fld>
             <a:endParaRPr lang="en-US"/>
           </a:p>
@@ -7069,7 +7072,7 @@
           <a:p>
             <a:fld id="{0897D7FB-8BED-4034-AF5C-6E1B4BE46DFA}" type="datetimeFigureOut">
               <a:rPr lang="en-US" smtClean="0"/>
-              <a:t>1/18/2025</a:t>
+              <a:t>1/19/2025</a:t>
             </a:fld>
             <a:endParaRPr lang="en-US"/>
           </a:p>
@@ -7289,7 +7292,7 @@
           <a:p>
             <a:fld id="{16182CD4-7864-421F-8E1E-1827F21A79E8}" type="datetimeFigureOut">
               <a:rPr lang="en-US" smtClean="0"/>
-              <a:t>1/18/2025</a:t>
+              <a:t>1/19/2025</a:t>
             </a:fld>
             <a:endParaRPr lang="en-US"/>
           </a:p>
@@ -7487,7 +7490,7 @@
           <a:p>
             <a:fld id="{16182CD4-7864-421F-8E1E-1827F21A79E8}" type="datetimeFigureOut">
               <a:rPr lang="en-US" smtClean="0"/>
-              <a:t>1/18/2025</a:t>
+              <a:t>1/19/2025</a:t>
             </a:fld>
             <a:endParaRPr lang="en-US"/>
           </a:p>
@@ -7762,7 +7765,7 @@
           <a:p>
             <a:fld id="{16182CD4-7864-421F-8E1E-1827F21A79E8}" type="datetimeFigureOut">
               <a:rPr lang="en-US" smtClean="0"/>
-              <a:t>1/18/2025</a:t>
+              <a:t>1/19/2025</a:t>
             </a:fld>
             <a:endParaRPr lang="en-US"/>
           </a:p>
@@ -8027,7 +8030,7 @@
           <a:p>
             <a:fld id="{16182CD4-7864-421F-8E1E-1827F21A79E8}" type="datetimeFigureOut">
               <a:rPr lang="en-US" smtClean="0"/>
-              <a:t>1/18/2025</a:t>
+              <a:t>1/19/2025</a:t>
             </a:fld>
             <a:endParaRPr lang="en-US"/>
           </a:p>
@@ -8439,7 +8442,7 @@
           <a:p>
             <a:fld id="{16182CD4-7864-421F-8E1E-1827F21A79E8}" type="datetimeFigureOut">
               <a:rPr lang="en-US" smtClean="0"/>
-              <a:t>1/18/2025</a:t>
+              <a:t>1/19/2025</a:t>
             </a:fld>
             <a:endParaRPr lang="en-US"/>
           </a:p>
@@ -8718,7 +8721,7 @@
           <a:p>
             <a:fld id="{7B38173E-2647-4277-8394-8E7FAFA72EB8}" type="datetimeFigureOut">
               <a:rPr lang="en-US" smtClean="0"/>
-              <a:t>1/18/2025</a:t>
+              <a:t>1/19/2025</a:t>
             </a:fld>
             <a:endParaRPr lang="en-US"/>
           </a:p>
@@ -8875,7 +8878,7 @@
           <a:p>
             <a:fld id="{16182CD4-7864-421F-8E1E-1827F21A79E8}" type="datetimeFigureOut">
               <a:rPr lang="en-US" smtClean="0"/>
-              <a:t>1/18/2025</a:t>
+              <a:t>1/19/2025</a:t>
             </a:fld>
             <a:endParaRPr lang="en-US"/>
           </a:p>
@@ -8988,7 +8991,7 @@
           <a:p>
             <a:fld id="{16182CD4-7864-421F-8E1E-1827F21A79E8}" type="datetimeFigureOut">
               <a:rPr lang="en-US" smtClean="0"/>
-              <a:t>1/18/2025</a:t>
+              <a:t>1/19/2025</a:t>
             </a:fld>
             <a:endParaRPr lang="en-US"/>
           </a:p>
@@ -9299,7 +9302,7 @@
           <a:p>
             <a:fld id="{16182CD4-7864-421F-8E1E-1827F21A79E8}" type="datetimeFigureOut">
               <a:rPr lang="en-US" smtClean="0"/>
-              <a:t>1/18/2025</a:t>
+              <a:t>1/19/2025</a:t>
             </a:fld>
             <a:endParaRPr lang="en-US"/>
           </a:p>
@@ -9587,7 +9590,7 @@
           <a:p>
             <a:fld id="{16182CD4-7864-421F-8E1E-1827F21A79E8}" type="datetimeFigureOut">
               <a:rPr lang="en-US" smtClean="0"/>
-              <a:t>1/18/2025</a:t>
+              <a:t>1/19/2025</a:t>
             </a:fld>
             <a:endParaRPr lang="en-US"/>
           </a:p>
@@ -9785,7 +9788,7 @@
           <a:p>
             <a:fld id="{16182CD4-7864-421F-8E1E-1827F21A79E8}" type="datetimeFigureOut">
               <a:rPr lang="en-US" smtClean="0"/>
-              <a:t>1/18/2025</a:t>
+              <a:t>1/19/2025</a:t>
             </a:fld>
             <a:endParaRPr lang="en-US"/>
           </a:p>
@@ -9993,7 +9996,7 @@
           <a:p>
             <a:fld id="{16182CD4-7864-421F-8E1E-1827F21A79E8}" type="datetimeFigureOut">
               <a:rPr lang="en-US" smtClean="0"/>
-              <a:t>1/18/2025</a:t>
+              <a:t>1/19/2025</a:t>
             </a:fld>
             <a:endParaRPr lang="en-US"/>
           </a:p>
@@ -10425,7 +10428,7 @@
           <a:p>
             <a:fld id="{7B38173E-2647-4277-8394-8E7FAFA72EB8}" type="datetimeFigureOut">
               <a:rPr lang="en-US" smtClean="0"/>
-              <a:t>1/18/2025</a:t>
+              <a:t>1/19/2025</a:t>
             </a:fld>
             <a:endParaRPr lang="en-US"/>
           </a:p>
@@ -10590,7 +10593,7 @@
           <a:p>
             <a:fld id="{7B38173E-2647-4277-8394-8E7FAFA72EB8}" type="datetimeFigureOut">
               <a:rPr lang="en-US" smtClean="0"/>
-              <a:t>1/18/2025</a:t>
+              <a:t>1/19/2025</a:t>
             </a:fld>
             <a:endParaRPr lang="en-US"/>
           </a:p>
@@ -10727,7 +10730,7 @@
           <a:p>
             <a:fld id="{7B38173E-2647-4277-8394-8E7FAFA72EB8}" type="datetimeFigureOut">
               <a:rPr lang="en-US" smtClean="0"/>
-              <a:t>1/18/2025</a:t>
+              <a:t>1/19/2025</a:t>
             </a:fld>
             <a:endParaRPr lang="en-US"/>
           </a:p>
@@ -11068,7 +11071,7 @@
           <a:p>
             <a:fld id="{7B38173E-2647-4277-8394-8E7FAFA72EB8}" type="datetimeFigureOut">
               <a:rPr lang="en-US" smtClean="0"/>
-              <a:t>1/18/2025</a:t>
+              <a:t>1/19/2025</a:t>
             </a:fld>
             <a:endParaRPr lang="en-US"/>
           </a:p>
@@ -11386,7 +11389,7 @@
           <a:p>
             <a:fld id="{7B38173E-2647-4277-8394-8E7FAFA72EB8}" type="datetimeFigureOut">
               <a:rPr lang="en-US" smtClean="0"/>
-              <a:t>1/18/2025</a:t>
+              <a:t>1/19/2025</a:t>
             </a:fld>
             <a:endParaRPr lang="en-US"/>
           </a:p>
@@ -12396,7 +12399,7 @@
           <a:p>
             <a:fld id="{6D3CD741-2E3C-46BC-BD4F-513FEA5EC99E}" type="datetimeFigureOut">
               <a:rPr lang="en-US" smtClean="0"/>
-              <a:t>1/18/2025</a:t>
+              <a:t>1/19/2025</a:t>
             </a:fld>
             <a:endParaRPr lang="en-US"/>
           </a:p>
@@ -13387,7 +13390,7 @@
           <a:p>
             <a:fld id="{0897D7FB-8BED-4034-AF5C-6E1B4BE46DFA}" type="datetimeFigureOut">
               <a:rPr lang="en-US" smtClean="0"/>
-              <a:t>1/18/2025</a:t>
+              <a:t>1/19/2025</a:t>
             </a:fld>
             <a:endParaRPr lang="en-US"/>
           </a:p>
@@ -13955,7 +13958,7 @@
           <a:p>
             <a:fld id="{16182CD4-7864-421F-8E1E-1827F21A79E8}" type="datetimeFigureOut">
               <a:rPr lang="en-US" smtClean="0"/>
-              <a:t>1/18/2025</a:t>
+              <a:t>1/19/2025</a:t>
             </a:fld>
             <a:endParaRPr lang="en-US"/>
           </a:p>
@@ -14423,7 +14426,7 @@
           <a:p>
             <a:r>
               <a:rPr lang="en-US" dirty="0"/>
-              <a:t>By Regeneration &amp; Piraeus Bank</a:t>
+              <a:t>Welcome slide</a:t>
             </a:r>
           </a:p>
           <a:p>
@@ -14445,6 +14448,606 @@
 </file>
 
 <file path=ppt/slides/slide10.xml><?xml version="1.0" encoding="utf-8"?>
+<p:sld xmlns:a="http://schemas.openxmlformats.org/drawingml/2006/main" xmlns:r="http://schemas.openxmlformats.org/officeDocument/2006/relationships" xmlns:p="http://schemas.openxmlformats.org/presentationml/2006/main">
+  <p:cSld>
+    <p:spTree>
+      <p:nvGrpSpPr>
+        <p:cNvPr id="1" name="">
+          <a:extLst>
+            <a:ext uri="{FF2B5EF4-FFF2-40B4-BE49-F238E27FC236}">
+              <a16:creationId xmlns:a16="http://schemas.microsoft.com/office/drawing/2014/main" id="{7EC8CBD1-15AA-AB84-F147-58779A75B5C2}"/>
+            </a:ext>
+          </a:extLst>
+        </p:cNvPr>
+        <p:cNvGrpSpPr/>
+        <p:nvPr/>
+      </p:nvGrpSpPr>
+      <p:grpSpPr>
+        <a:xfrm>
+          <a:off x="0" y="0"/>
+          <a:ext cx="0" cy="0"/>
+          <a:chOff x="0" y="0"/>
+          <a:chExt cx="0" cy="0"/>
+        </a:xfrm>
+      </p:grpSpPr>
+      <p:sp>
+        <p:nvSpPr>
+          <p:cNvPr id="2" name="Picture Placeholder 1">
+            <a:extLst>
+              <a:ext uri="{FF2B5EF4-FFF2-40B4-BE49-F238E27FC236}">
+                <a16:creationId xmlns:a16="http://schemas.microsoft.com/office/drawing/2014/main" id="{B7F3E402-4F46-86A0-0C41-8164AF066054}"/>
+              </a:ext>
+            </a:extLst>
+          </p:cNvPr>
+          <p:cNvSpPr>
+            <a:spLocks noGrp="1"/>
+          </p:cNvSpPr>
+          <p:nvPr>
+            <p:ph type="pic" sz="quarter" idx="13"/>
+          </p:nvPr>
+        </p:nvSpPr>
+        <p:spPr/>
+        <p:txBody>
+          <a:bodyPr/>
+          <a:lstStyle/>
+          <a:p>
+            <a:endParaRPr lang="en-US"/>
+          </a:p>
+        </p:txBody>
+      </p:sp>
+      <p:sp>
+        <p:nvSpPr>
+          <p:cNvPr id="3" name="Title 2">
+            <a:extLst>
+              <a:ext uri="{FF2B5EF4-FFF2-40B4-BE49-F238E27FC236}">
+                <a16:creationId xmlns:a16="http://schemas.microsoft.com/office/drawing/2014/main" id="{245567B9-FF87-2033-8673-879CD30E4526}"/>
+              </a:ext>
+            </a:extLst>
+          </p:cNvPr>
+          <p:cNvSpPr>
+            <a:spLocks noGrp="1"/>
+          </p:cNvSpPr>
+          <p:nvPr>
+            <p:ph type="ctrTitle"/>
+          </p:nvPr>
+        </p:nvSpPr>
+        <p:spPr/>
+        <p:txBody>
+          <a:bodyPr/>
+          <a:lstStyle/>
+          <a:p>
+            <a:r>
+              <a:rPr lang="en-US" dirty="0"/>
+              <a:t>Employee Sales Performance</a:t>
+            </a:r>
+          </a:p>
+        </p:txBody>
+      </p:sp>
+      <p:sp>
+        <p:nvSpPr>
+          <p:cNvPr id="4" name="Content Placeholder 3">
+            <a:extLst>
+              <a:ext uri="{FF2B5EF4-FFF2-40B4-BE49-F238E27FC236}">
+                <a16:creationId xmlns:a16="http://schemas.microsoft.com/office/drawing/2014/main" id="{0F917385-8B1C-3EF6-8124-20BD40B56F2D}"/>
+              </a:ext>
+            </a:extLst>
+          </p:cNvPr>
+          <p:cNvSpPr>
+            <a:spLocks noGrp="1"/>
+          </p:cNvSpPr>
+          <p:nvPr>
+            <p:ph sz="quarter" idx="14"/>
+          </p:nvPr>
+        </p:nvSpPr>
+        <p:spPr/>
+        <p:txBody>
+          <a:bodyPr/>
+          <a:lstStyle/>
+          <a:p>
+            <a:pPr marL="0" indent="0">
+              <a:buNone/>
+            </a:pPr>
+            <a:r>
+              <a:rPr lang="en-US" dirty="0"/>
+              <a:t>Data extraction with SQL Script</a:t>
+            </a:r>
+          </a:p>
+        </p:txBody>
+      </p:sp>
+    </p:spTree>
+    <p:extLst>
+      <p:ext uri="{BB962C8B-B14F-4D97-AF65-F5344CB8AC3E}">
+        <p14:creationId xmlns:p14="http://schemas.microsoft.com/office/powerpoint/2010/main" val="2704224281"/>
+      </p:ext>
+    </p:extLst>
+  </p:cSld>
+  <p:clrMapOvr>
+    <a:masterClrMapping/>
+  </p:clrMapOvr>
+</p:sld>
+</file>
+
+<file path=ppt/slides/slide11.xml><?xml version="1.0" encoding="utf-8"?>
+<p:sld xmlns:a="http://schemas.openxmlformats.org/drawingml/2006/main" xmlns:r="http://schemas.openxmlformats.org/officeDocument/2006/relationships" xmlns:p="http://schemas.openxmlformats.org/presentationml/2006/main">
+  <p:cSld>
+    <p:spTree>
+      <p:nvGrpSpPr>
+        <p:cNvPr id="1" name="">
+          <a:extLst>
+            <a:ext uri="{FF2B5EF4-FFF2-40B4-BE49-F238E27FC236}">
+              <a16:creationId xmlns:a16="http://schemas.microsoft.com/office/drawing/2014/main" id="{3DF59C08-CB37-C23D-291B-72E8E95271E0}"/>
+            </a:ext>
+          </a:extLst>
+        </p:cNvPr>
+        <p:cNvGrpSpPr/>
+        <p:nvPr/>
+      </p:nvGrpSpPr>
+      <p:grpSpPr>
+        <a:xfrm>
+          <a:off x="0" y="0"/>
+          <a:ext cx="0" cy="0"/>
+          <a:chOff x="0" y="0"/>
+          <a:chExt cx="0" cy="0"/>
+        </a:xfrm>
+      </p:grpSpPr>
+      <p:sp>
+        <p:nvSpPr>
+          <p:cNvPr id="2" name="Picture Placeholder 1">
+            <a:extLst>
+              <a:ext uri="{FF2B5EF4-FFF2-40B4-BE49-F238E27FC236}">
+                <a16:creationId xmlns:a16="http://schemas.microsoft.com/office/drawing/2014/main" id="{A63826C5-2438-9B11-841D-64DB4E3D7C3B}"/>
+              </a:ext>
+            </a:extLst>
+          </p:cNvPr>
+          <p:cNvSpPr>
+            <a:spLocks noGrp="1"/>
+          </p:cNvSpPr>
+          <p:nvPr>
+            <p:ph type="pic" sz="quarter" idx="13"/>
+          </p:nvPr>
+        </p:nvSpPr>
+        <p:spPr/>
+        <p:txBody>
+          <a:bodyPr/>
+          <a:lstStyle/>
+          <a:p>
+            <a:endParaRPr lang="en-US"/>
+          </a:p>
+        </p:txBody>
+      </p:sp>
+      <p:sp>
+        <p:nvSpPr>
+          <p:cNvPr id="3" name="Title 2">
+            <a:extLst>
+              <a:ext uri="{FF2B5EF4-FFF2-40B4-BE49-F238E27FC236}">
+                <a16:creationId xmlns:a16="http://schemas.microsoft.com/office/drawing/2014/main" id="{61B0E419-6AC5-99B2-2675-EFBEB60A1FED}"/>
+              </a:ext>
+            </a:extLst>
+          </p:cNvPr>
+          <p:cNvSpPr>
+            <a:spLocks noGrp="1"/>
+          </p:cNvSpPr>
+          <p:nvPr>
+            <p:ph type="ctrTitle"/>
+          </p:nvPr>
+        </p:nvSpPr>
+        <p:spPr/>
+        <p:txBody>
+          <a:bodyPr/>
+          <a:lstStyle/>
+          <a:p>
+            <a:r>
+              <a:rPr lang="en-US" dirty="0"/>
+              <a:t>Employee Sales Performance</a:t>
+            </a:r>
+          </a:p>
+        </p:txBody>
+      </p:sp>
+      <p:sp>
+        <p:nvSpPr>
+          <p:cNvPr id="4" name="Content Placeholder 3">
+            <a:extLst>
+              <a:ext uri="{FF2B5EF4-FFF2-40B4-BE49-F238E27FC236}">
+                <a16:creationId xmlns:a16="http://schemas.microsoft.com/office/drawing/2014/main" id="{470E2E1A-7781-0173-3C19-1C476D434732}"/>
+              </a:ext>
+            </a:extLst>
+          </p:cNvPr>
+          <p:cNvSpPr>
+            <a:spLocks noGrp="1"/>
+          </p:cNvSpPr>
+          <p:nvPr>
+            <p:ph sz="quarter" idx="14"/>
+          </p:nvPr>
+        </p:nvSpPr>
+        <p:spPr/>
+        <p:txBody>
+          <a:bodyPr/>
+          <a:lstStyle/>
+          <a:p>
+            <a:pPr marL="0" indent="0">
+              <a:buNone/>
+            </a:pPr>
+            <a:r>
+              <a:rPr lang="en-US" dirty="0"/>
+              <a:t>Pre-Processing Procedure and comments</a:t>
+            </a:r>
+          </a:p>
+        </p:txBody>
+      </p:sp>
+    </p:spTree>
+    <p:extLst>
+      <p:ext uri="{BB962C8B-B14F-4D97-AF65-F5344CB8AC3E}">
+        <p14:creationId xmlns:p14="http://schemas.microsoft.com/office/powerpoint/2010/main" val="863411072"/>
+      </p:ext>
+    </p:extLst>
+  </p:cSld>
+  <p:clrMapOvr>
+    <a:masterClrMapping/>
+  </p:clrMapOvr>
+</p:sld>
+</file>
+
+<file path=ppt/slides/slide12.xml><?xml version="1.0" encoding="utf-8"?>
+<p:sld xmlns:a="http://schemas.openxmlformats.org/drawingml/2006/main" xmlns:r="http://schemas.openxmlformats.org/officeDocument/2006/relationships" xmlns:p="http://schemas.openxmlformats.org/presentationml/2006/main">
+  <p:cSld>
+    <p:spTree>
+      <p:nvGrpSpPr>
+        <p:cNvPr id="1" name="">
+          <a:extLst>
+            <a:ext uri="{FF2B5EF4-FFF2-40B4-BE49-F238E27FC236}">
+              <a16:creationId xmlns:a16="http://schemas.microsoft.com/office/drawing/2014/main" id="{16F831C0-3127-B5ED-D9DC-71B6D85DCC03}"/>
+            </a:ext>
+          </a:extLst>
+        </p:cNvPr>
+        <p:cNvGrpSpPr/>
+        <p:nvPr/>
+      </p:nvGrpSpPr>
+      <p:grpSpPr>
+        <a:xfrm>
+          <a:off x="0" y="0"/>
+          <a:ext cx="0" cy="0"/>
+          <a:chOff x="0" y="0"/>
+          <a:chExt cx="0" cy="0"/>
+        </a:xfrm>
+      </p:grpSpPr>
+      <p:sp>
+        <p:nvSpPr>
+          <p:cNvPr id="2" name="Picture Placeholder 1">
+            <a:extLst>
+              <a:ext uri="{FF2B5EF4-FFF2-40B4-BE49-F238E27FC236}">
+                <a16:creationId xmlns:a16="http://schemas.microsoft.com/office/drawing/2014/main" id="{C9C88D03-6CE7-86BD-5F23-2887158399D7}"/>
+              </a:ext>
+            </a:extLst>
+          </p:cNvPr>
+          <p:cNvSpPr>
+            <a:spLocks noGrp="1"/>
+          </p:cNvSpPr>
+          <p:nvPr>
+            <p:ph type="pic" sz="quarter" idx="13"/>
+          </p:nvPr>
+        </p:nvSpPr>
+        <p:spPr/>
+        <p:txBody>
+          <a:bodyPr/>
+          <a:lstStyle/>
+          <a:p>
+            <a:endParaRPr lang="en-US" dirty="0"/>
+          </a:p>
+        </p:txBody>
+      </p:sp>
+      <p:sp>
+        <p:nvSpPr>
+          <p:cNvPr id="3" name="Title 2">
+            <a:extLst>
+              <a:ext uri="{FF2B5EF4-FFF2-40B4-BE49-F238E27FC236}">
+                <a16:creationId xmlns:a16="http://schemas.microsoft.com/office/drawing/2014/main" id="{515467A6-834B-98C5-22AD-7456757BE2B4}"/>
+              </a:ext>
+            </a:extLst>
+          </p:cNvPr>
+          <p:cNvSpPr>
+            <a:spLocks noGrp="1"/>
+          </p:cNvSpPr>
+          <p:nvPr>
+            <p:ph type="ctrTitle"/>
+          </p:nvPr>
+        </p:nvSpPr>
+        <p:spPr/>
+        <p:txBody>
+          <a:bodyPr/>
+          <a:lstStyle/>
+          <a:p>
+            <a:r>
+              <a:rPr lang="en-US" dirty="0"/>
+              <a:t>Employee Sales Performance</a:t>
+            </a:r>
+          </a:p>
+        </p:txBody>
+      </p:sp>
+      <p:sp>
+        <p:nvSpPr>
+          <p:cNvPr id="4" name="Content Placeholder 3">
+            <a:extLst>
+              <a:ext uri="{FF2B5EF4-FFF2-40B4-BE49-F238E27FC236}">
+                <a16:creationId xmlns:a16="http://schemas.microsoft.com/office/drawing/2014/main" id="{54E28D1C-26D3-3776-7DCF-654B02978413}"/>
+              </a:ext>
+            </a:extLst>
+          </p:cNvPr>
+          <p:cNvSpPr>
+            <a:spLocks noGrp="1"/>
+          </p:cNvSpPr>
+          <p:nvPr>
+            <p:ph sz="quarter" idx="14"/>
+          </p:nvPr>
+        </p:nvSpPr>
+        <p:spPr/>
+        <p:txBody>
+          <a:bodyPr/>
+          <a:lstStyle/>
+          <a:p>
+            <a:pPr marL="0" indent="0">
+              <a:buNone/>
+            </a:pPr>
+            <a:r>
+              <a:rPr lang="en-US" dirty="0"/>
+              <a:t>Performance labels and comments</a:t>
+            </a:r>
+          </a:p>
+        </p:txBody>
+      </p:sp>
+    </p:spTree>
+    <p:extLst>
+      <p:ext uri="{BB962C8B-B14F-4D97-AF65-F5344CB8AC3E}">
+        <p14:creationId xmlns:p14="http://schemas.microsoft.com/office/powerpoint/2010/main" val="4093411706"/>
+      </p:ext>
+    </p:extLst>
+  </p:cSld>
+  <p:clrMapOvr>
+    <a:masterClrMapping/>
+  </p:clrMapOvr>
+</p:sld>
+</file>
+
+<file path=ppt/slides/slide13.xml><?xml version="1.0" encoding="utf-8"?>
+<p:sld xmlns:a="http://schemas.openxmlformats.org/drawingml/2006/main" xmlns:r="http://schemas.openxmlformats.org/officeDocument/2006/relationships" xmlns:p="http://schemas.openxmlformats.org/presentationml/2006/main">
+  <p:cSld>
+    <p:spTree>
+      <p:nvGrpSpPr>
+        <p:cNvPr id="1" name="">
+          <a:extLst>
+            <a:ext uri="{FF2B5EF4-FFF2-40B4-BE49-F238E27FC236}">
+              <a16:creationId xmlns:a16="http://schemas.microsoft.com/office/drawing/2014/main" id="{335E279A-7941-B91B-540C-561BB9E4C819}"/>
+            </a:ext>
+          </a:extLst>
+        </p:cNvPr>
+        <p:cNvGrpSpPr/>
+        <p:nvPr/>
+      </p:nvGrpSpPr>
+      <p:grpSpPr>
+        <a:xfrm>
+          <a:off x="0" y="0"/>
+          <a:ext cx="0" cy="0"/>
+          <a:chOff x="0" y="0"/>
+          <a:chExt cx="0" cy="0"/>
+        </a:xfrm>
+      </p:grpSpPr>
+      <p:sp>
+        <p:nvSpPr>
+          <p:cNvPr id="2" name="Picture Placeholder 1">
+            <a:extLst>
+              <a:ext uri="{FF2B5EF4-FFF2-40B4-BE49-F238E27FC236}">
+                <a16:creationId xmlns:a16="http://schemas.microsoft.com/office/drawing/2014/main" id="{A562264E-AD7D-FC16-1F70-59EB446DFC7A}"/>
+              </a:ext>
+            </a:extLst>
+          </p:cNvPr>
+          <p:cNvSpPr>
+            <a:spLocks noGrp="1"/>
+          </p:cNvSpPr>
+          <p:nvPr>
+            <p:ph type="pic" sz="quarter" idx="13"/>
+          </p:nvPr>
+        </p:nvSpPr>
+        <p:spPr/>
+        <p:txBody>
+          <a:bodyPr/>
+          <a:lstStyle/>
+          <a:p>
+            <a:endParaRPr lang="en-US"/>
+          </a:p>
+        </p:txBody>
+      </p:sp>
+      <p:sp>
+        <p:nvSpPr>
+          <p:cNvPr id="3" name="Title 2">
+            <a:extLst>
+              <a:ext uri="{FF2B5EF4-FFF2-40B4-BE49-F238E27FC236}">
+                <a16:creationId xmlns:a16="http://schemas.microsoft.com/office/drawing/2014/main" id="{47EF97E6-1A26-B712-EA2D-F6137210414C}"/>
+              </a:ext>
+            </a:extLst>
+          </p:cNvPr>
+          <p:cNvSpPr>
+            <a:spLocks noGrp="1"/>
+          </p:cNvSpPr>
+          <p:nvPr>
+            <p:ph type="ctrTitle"/>
+          </p:nvPr>
+        </p:nvSpPr>
+        <p:spPr/>
+        <p:txBody>
+          <a:bodyPr/>
+          <a:lstStyle/>
+          <a:p>
+            <a:r>
+              <a:rPr lang="en-US" dirty="0"/>
+              <a:t>Employee Sales Performance</a:t>
+            </a:r>
+          </a:p>
+        </p:txBody>
+      </p:sp>
+      <p:sp>
+        <p:nvSpPr>
+          <p:cNvPr id="4" name="Content Placeholder 3">
+            <a:extLst>
+              <a:ext uri="{FF2B5EF4-FFF2-40B4-BE49-F238E27FC236}">
+                <a16:creationId xmlns:a16="http://schemas.microsoft.com/office/drawing/2014/main" id="{FABABC53-F01F-59EA-44CC-764FFA49F755}"/>
+              </a:ext>
+            </a:extLst>
+          </p:cNvPr>
+          <p:cNvSpPr>
+            <a:spLocks noGrp="1"/>
+          </p:cNvSpPr>
+          <p:nvPr>
+            <p:ph sz="quarter" idx="14"/>
+          </p:nvPr>
+        </p:nvSpPr>
+        <p:spPr/>
+        <p:txBody>
+          <a:bodyPr/>
+          <a:lstStyle/>
+          <a:p>
+            <a:pPr marL="0" indent="0">
+              <a:buNone/>
+            </a:pPr>
+            <a:r>
+              <a:rPr lang="en-US" dirty="0"/>
+              <a:t>Machine learning pipeline deliverables and comments</a:t>
+            </a:r>
+          </a:p>
+        </p:txBody>
+      </p:sp>
+    </p:spTree>
+    <p:extLst>
+      <p:ext uri="{BB962C8B-B14F-4D97-AF65-F5344CB8AC3E}">
+        <p14:creationId xmlns:p14="http://schemas.microsoft.com/office/powerpoint/2010/main" val="3876590593"/>
+      </p:ext>
+    </p:extLst>
+  </p:cSld>
+  <p:clrMapOvr>
+    <a:masterClrMapping/>
+  </p:clrMapOvr>
+</p:sld>
+</file>
+
+<file path=ppt/slides/slide14.xml><?xml version="1.0" encoding="utf-8"?>
+<p:sld xmlns:a="http://schemas.openxmlformats.org/drawingml/2006/main" xmlns:r="http://schemas.openxmlformats.org/officeDocument/2006/relationships" xmlns:p="http://schemas.openxmlformats.org/presentationml/2006/main">
+  <p:cSld>
+    <p:spTree>
+      <p:nvGrpSpPr>
+        <p:cNvPr id="1" name="">
+          <a:extLst>
+            <a:ext uri="{FF2B5EF4-FFF2-40B4-BE49-F238E27FC236}">
+              <a16:creationId xmlns:a16="http://schemas.microsoft.com/office/drawing/2014/main" id="{8E42D276-F6E0-79EB-A1BC-3AA1B74EA6D9}"/>
+            </a:ext>
+          </a:extLst>
+        </p:cNvPr>
+        <p:cNvGrpSpPr/>
+        <p:nvPr/>
+      </p:nvGrpSpPr>
+      <p:grpSpPr>
+        <a:xfrm>
+          <a:off x="0" y="0"/>
+          <a:ext cx="0" cy="0"/>
+          <a:chOff x="0" y="0"/>
+          <a:chExt cx="0" cy="0"/>
+        </a:xfrm>
+      </p:grpSpPr>
+      <p:sp>
+        <p:nvSpPr>
+          <p:cNvPr id="2" name="Picture Placeholder 1">
+            <a:extLst>
+              <a:ext uri="{FF2B5EF4-FFF2-40B4-BE49-F238E27FC236}">
+                <a16:creationId xmlns:a16="http://schemas.microsoft.com/office/drawing/2014/main" id="{689CF3E9-A88D-F2CB-5EA4-F5A5111F77F9}"/>
+              </a:ext>
+            </a:extLst>
+          </p:cNvPr>
+          <p:cNvSpPr>
+            <a:spLocks noGrp="1"/>
+          </p:cNvSpPr>
+          <p:nvPr>
+            <p:ph type="pic" sz="quarter" idx="13"/>
+          </p:nvPr>
+        </p:nvSpPr>
+        <p:spPr/>
+        <p:txBody>
+          <a:bodyPr/>
+          <a:lstStyle/>
+          <a:p>
+            <a:endParaRPr lang="en-US"/>
+          </a:p>
+        </p:txBody>
+      </p:sp>
+      <p:sp>
+        <p:nvSpPr>
+          <p:cNvPr id="3" name="Title 2">
+            <a:extLst>
+              <a:ext uri="{FF2B5EF4-FFF2-40B4-BE49-F238E27FC236}">
+                <a16:creationId xmlns:a16="http://schemas.microsoft.com/office/drawing/2014/main" id="{CF45ADFD-796F-199A-48D0-DF6D0E7199B3}"/>
+              </a:ext>
+            </a:extLst>
+          </p:cNvPr>
+          <p:cNvSpPr>
+            <a:spLocks noGrp="1"/>
+          </p:cNvSpPr>
+          <p:nvPr>
+            <p:ph type="ctrTitle"/>
+          </p:nvPr>
+        </p:nvSpPr>
+        <p:spPr/>
+        <p:txBody>
+          <a:bodyPr/>
+          <a:lstStyle/>
+          <a:p>
+            <a:r>
+              <a:rPr lang="en-US" dirty="0"/>
+              <a:t>Employee Sales Performance</a:t>
+            </a:r>
+          </a:p>
+        </p:txBody>
+      </p:sp>
+      <p:sp>
+        <p:nvSpPr>
+          <p:cNvPr id="4" name="Content Placeholder 3">
+            <a:extLst>
+              <a:ext uri="{FF2B5EF4-FFF2-40B4-BE49-F238E27FC236}">
+                <a16:creationId xmlns:a16="http://schemas.microsoft.com/office/drawing/2014/main" id="{B2FBA0DC-C551-A581-97CD-22FF5C2A31D6}"/>
+              </a:ext>
+            </a:extLst>
+          </p:cNvPr>
+          <p:cNvSpPr>
+            <a:spLocks noGrp="1"/>
+          </p:cNvSpPr>
+          <p:nvPr>
+            <p:ph sz="quarter" idx="14"/>
+          </p:nvPr>
+        </p:nvSpPr>
+        <p:spPr/>
+        <p:txBody>
+          <a:bodyPr/>
+          <a:lstStyle/>
+          <a:p>
+            <a:pPr marL="0" indent="0">
+              <a:buNone/>
+            </a:pPr>
+            <a:r>
+              <a:rPr lang="en-US" dirty="0"/>
+              <a:t>Machine learning pipeline deliverables and comments</a:t>
+            </a:r>
+          </a:p>
+        </p:txBody>
+      </p:sp>
+    </p:spTree>
+    <p:extLst>
+      <p:ext uri="{BB962C8B-B14F-4D97-AF65-F5344CB8AC3E}">
+        <p14:creationId xmlns:p14="http://schemas.microsoft.com/office/powerpoint/2010/main" val="2123166288"/>
+      </p:ext>
+    </p:extLst>
+  </p:cSld>
+  <p:clrMapOvr>
+    <a:masterClrMapping/>
+  </p:clrMapOvr>
+</p:sld>
+</file>
+
+<file path=ppt/slides/slide15.xml><?xml version="1.0" encoding="utf-8"?>
 <p:sld xmlns:a="http://schemas.openxmlformats.org/drawingml/2006/main" xmlns:r="http://schemas.openxmlformats.org/officeDocument/2006/relationships" xmlns:p="http://schemas.openxmlformats.org/presentationml/2006/main">
   <p:cSld>
     <p:spTree>
@@ -14513,7 +15116,10 @@
           <a:bodyPr/>
           <a:lstStyle/>
           <a:p>
-            <a:endParaRPr lang="en-US"/>
+            <a:r>
+              <a:rPr lang="en-US" dirty="0"/>
+              <a:t>Employee Sales Performance</a:t>
+            </a:r>
           </a:p>
         </p:txBody>
       </p:sp>
@@ -14538,7 +15144,13 @@
           <a:bodyPr/>
           <a:lstStyle/>
           <a:p>
-            <a:endParaRPr lang="en-US"/>
+            <a:pPr marL="0" indent="0">
+              <a:buNone/>
+            </a:pPr>
+            <a:r>
+              <a:rPr lang="en-US" dirty="0"/>
+              <a:t>Results of Machine Learning model and comments</a:t>
+            </a:r>
           </a:p>
         </p:txBody>
       </p:sp>
@@ -14555,7 +15167,7 @@
 </p:sld>
 </file>
 
-<file path=ppt/slides/slide11.xml><?xml version="1.0" encoding="utf-8"?>
+<file path=ppt/slides/slide16.xml><?xml version="1.0" encoding="utf-8"?>
 <p:sld xmlns:a="http://schemas.openxmlformats.org/drawingml/2006/main" xmlns:r="http://schemas.openxmlformats.org/officeDocument/2006/relationships" xmlns:p="http://schemas.openxmlformats.org/presentationml/2006/main">
   <p:cSld>
     <p:spTree>
@@ -14599,7 +15211,7 @@
           <a:bodyPr/>
           <a:lstStyle/>
           <a:p>
-            <a:endParaRPr lang="en-US"/>
+            <a:endParaRPr lang="en-US" dirty="0"/>
           </a:p>
         </p:txBody>
       </p:sp>
@@ -14624,7 +15236,10 @@
           <a:bodyPr/>
           <a:lstStyle/>
           <a:p>
-            <a:endParaRPr lang="en-US"/>
+            <a:r>
+              <a:rPr lang="en-US" dirty="0"/>
+              <a:t>Sum up  </a:t>
+            </a:r>
           </a:p>
         </p:txBody>
       </p:sp>
@@ -14649,7 +15264,13 @@
           <a:bodyPr/>
           <a:lstStyle/>
           <a:p>
-            <a:endParaRPr lang="en-US"/>
+            <a:pPr marL="0" indent="0">
+              <a:buNone/>
+            </a:pPr>
+            <a:r>
+              <a:rPr lang="en-US" dirty="0"/>
+              <a:t>Solution for the project and what we have learned</a:t>
+            </a:r>
           </a:p>
         </p:txBody>
       </p:sp>
@@ -14666,229 +15287,7 @@
 </p:sld>
 </file>
 
-<file path=ppt/slides/slide12.xml><?xml version="1.0" encoding="utf-8"?>
-<p:sld xmlns:a="http://schemas.openxmlformats.org/drawingml/2006/main" xmlns:r="http://schemas.openxmlformats.org/officeDocument/2006/relationships" xmlns:p="http://schemas.openxmlformats.org/presentationml/2006/main">
-  <p:cSld>
-    <p:spTree>
-      <p:nvGrpSpPr>
-        <p:cNvPr id="1" name="">
-          <a:extLst>
-            <a:ext uri="{FF2B5EF4-FFF2-40B4-BE49-F238E27FC236}">
-              <a16:creationId xmlns:a16="http://schemas.microsoft.com/office/drawing/2014/main" id="{9EF8DD80-B869-0813-CDF0-8C0F1DB72535}"/>
-            </a:ext>
-          </a:extLst>
-        </p:cNvPr>
-        <p:cNvGrpSpPr/>
-        <p:nvPr/>
-      </p:nvGrpSpPr>
-      <p:grpSpPr>
-        <a:xfrm>
-          <a:off x="0" y="0"/>
-          <a:ext cx="0" cy="0"/>
-          <a:chOff x="0" y="0"/>
-          <a:chExt cx="0" cy="0"/>
-        </a:xfrm>
-      </p:grpSpPr>
-      <p:sp>
-        <p:nvSpPr>
-          <p:cNvPr id="2" name="Picture Placeholder 1">
-            <a:extLst>
-              <a:ext uri="{FF2B5EF4-FFF2-40B4-BE49-F238E27FC236}">
-                <a16:creationId xmlns:a16="http://schemas.microsoft.com/office/drawing/2014/main" id="{539D0D6D-EB96-9B97-06D7-896EED8BAA4B}"/>
-              </a:ext>
-            </a:extLst>
-          </p:cNvPr>
-          <p:cNvSpPr>
-            <a:spLocks noGrp="1"/>
-          </p:cNvSpPr>
-          <p:nvPr>
-            <p:ph type="pic" sz="quarter" idx="13"/>
-          </p:nvPr>
-        </p:nvSpPr>
-        <p:spPr/>
-        <p:txBody>
-          <a:bodyPr/>
-          <a:lstStyle/>
-          <a:p>
-            <a:endParaRPr lang="en-US"/>
-          </a:p>
-        </p:txBody>
-      </p:sp>
-      <p:sp>
-        <p:nvSpPr>
-          <p:cNvPr id="3" name="Title 2">
-            <a:extLst>
-              <a:ext uri="{FF2B5EF4-FFF2-40B4-BE49-F238E27FC236}">
-                <a16:creationId xmlns:a16="http://schemas.microsoft.com/office/drawing/2014/main" id="{E68D93C2-92B8-B1E7-CA5B-3421F290EFA9}"/>
-              </a:ext>
-            </a:extLst>
-          </p:cNvPr>
-          <p:cNvSpPr>
-            <a:spLocks noGrp="1"/>
-          </p:cNvSpPr>
-          <p:nvPr>
-            <p:ph type="ctrTitle"/>
-          </p:nvPr>
-        </p:nvSpPr>
-        <p:spPr/>
-        <p:txBody>
-          <a:bodyPr/>
-          <a:lstStyle/>
-          <a:p>
-            <a:endParaRPr lang="en-US"/>
-          </a:p>
-        </p:txBody>
-      </p:sp>
-      <p:sp>
-        <p:nvSpPr>
-          <p:cNvPr id="4" name="Content Placeholder 3">
-            <a:extLst>
-              <a:ext uri="{FF2B5EF4-FFF2-40B4-BE49-F238E27FC236}">
-                <a16:creationId xmlns:a16="http://schemas.microsoft.com/office/drawing/2014/main" id="{A8720555-9E55-C09F-CD8D-FC6885350FDB}"/>
-              </a:ext>
-            </a:extLst>
-          </p:cNvPr>
-          <p:cNvSpPr>
-            <a:spLocks noGrp="1"/>
-          </p:cNvSpPr>
-          <p:nvPr>
-            <p:ph sz="quarter" idx="14"/>
-          </p:nvPr>
-        </p:nvSpPr>
-        <p:spPr/>
-        <p:txBody>
-          <a:bodyPr/>
-          <a:lstStyle/>
-          <a:p>
-            <a:endParaRPr lang="en-US"/>
-          </a:p>
-        </p:txBody>
-      </p:sp>
-    </p:spTree>
-    <p:extLst>
-      <p:ext uri="{BB962C8B-B14F-4D97-AF65-F5344CB8AC3E}">
-        <p14:creationId xmlns:p14="http://schemas.microsoft.com/office/powerpoint/2010/main" val="3339935813"/>
-      </p:ext>
-    </p:extLst>
-  </p:cSld>
-  <p:clrMapOvr>
-    <a:masterClrMapping/>
-  </p:clrMapOvr>
-</p:sld>
-</file>
-
-<file path=ppt/slides/slide13.xml><?xml version="1.0" encoding="utf-8"?>
-<p:sld xmlns:a="http://schemas.openxmlformats.org/drawingml/2006/main" xmlns:r="http://schemas.openxmlformats.org/officeDocument/2006/relationships" xmlns:p="http://schemas.openxmlformats.org/presentationml/2006/main">
-  <p:cSld>
-    <p:spTree>
-      <p:nvGrpSpPr>
-        <p:cNvPr id="1" name="">
-          <a:extLst>
-            <a:ext uri="{FF2B5EF4-FFF2-40B4-BE49-F238E27FC236}">
-              <a16:creationId xmlns:a16="http://schemas.microsoft.com/office/drawing/2014/main" id="{4313D50F-E405-A8FD-F486-D6EC75E8EB17}"/>
-            </a:ext>
-          </a:extLst>
-        </p:cNvPr>
-        <p:cNvGrpSpPr/>
-        <p:nvPr/>
-      </p:nvGrpSpPr>
-      <p:grpSpPr>
-        <a:xfrm>
-          <a:off x="0" y="0"/>
-          <a:ext cx="0" cy="0"/>
-          <a:chOff x="0" y="0"/>
-          <a:chExt cx="0" cy="0"/>
-        </a:xfrm>
-      </p:grpSpPr>
-      <p:sp>
-        <p:nvSpPr>
-          <p:cNvPr id="2" name="Picture Placeholder 1">
-            <a:extLst>
-              <a:ext uri="{FF2B5EF4-FFF2-40B4-BE49-F238E27FC236}">
-                <a16:creationId xmlns:a16="http://schemas.microsoft.com/office/drawing/2014/main" id="{838A50E8-9476-7E0D-EBEA-768449B5DEC6}"/>
-              </a:ext>
-            </a:extLst>
-          </p:cNvPr>
-          <p:cNvSpPr>
-            <a:spLocks noGrp="1"/>
-          </p:cNvSpPr>
-          <p:nvPr>
-            <p:ph type="pic" sz="quarter" idx="13"/>
-          </p:nvPr>
-        </p:nvSpPr>
-        <p:spPr/>
-        <p:txBody>
-          <a:bodyPr/>
-          <a:lstStyle/>
-          <a:p>
-            <a:endParaRPr lang="en-US"/>
-          </a:p>
-        </p:txBody>
-      </p:sp>
-      <p:sp>
-        <p:nvSpPr>
-          <p:cNvPr id="3" name="Title 2">
-            <a:extLst>
-              <a:ext uri="{FF2B5EF4-FFF2-40B4-BE49-F238E27FC236}">
-                <a16:creationId xmlns:a16="http://schemas.microsoft.com/office/drawing/2014/main" id="{FD130213-E88D-E528-59CB-AB00A0981FF3}"/>
-              </a:ext>
-            </a:extLst>
-          </p:cNvPr>
-          <p:cNvSpPr>
-            <a:spLocks noGrp="1"/>
-          </p:cNvSpPr>
-          <p:nvPr>
-            <p:ph type="ctrTitle"/>
-          </p:nvPr>
-        </p:nvSpPr>
-        <p:spPr/>
-        <p:txBody>
-          <a:bodyPr/>
-          <a:lstStyle/>
-          <a:p>
-            <a:endParaRPr lang="en-US"/>
-          </a:p>
-        </p:txBody>
-      </p:sp>
-      <p:sp>
-        <p:nvSpPr>
-          <p:cNvPr id="4" name="Content Placeholder 3">
-            <a:extLst>
-              <a:ext uri="{FF2B5EF4-FFF2-40B4-BE49-F238E27FC236}">
-                <a16:creationId xmlns:a16="http://schemas.microsoft.com/office/drawing/2014/main" id="{1D2A3064-E2AA-0E4F-826E-AB000A5EE88B}"/>
-              </a:ext>
-            </a:extLst>
-          </p:cNvPr>
-          <p:cNvSpPr>
-            <a:spLocks noGrp="1"/>
-          </p:cNvSpPr>
-          <p:nvPr>
-            <p:ph sz="quarter" idx="14"/>
-          </p:nvPr>
-        </p:nvSpPr>
-        <p:spPr/>
-        <p:txBody>
-          <a:bodyPr/>
-          <a:lstStyle/>
-          <a:p>
-            <a:endParaRPr lang="en-US"/>
-          </a:p>
-        </p:txBody>
-      </p:sp>
-    </p:spTree>
-    <p:extLst>
-      <p:ext uri="{BB962C8B-B14F-4D97-AF65-F5344CB8AC3E}">
-        <p14:creationId xmlns:p14="http://schemas.microsoft.com/office/powerpoint/2010/main" val="776875261"/>
-      </p:ext>
-    </p:extLst>
-  </p:cSld>
-  <p:clrMapOvr>
-    <a:masterClrMapping/>
-  </p:clrMapOvr>
-</p:sld>
-</file>
-
-<file path=ppt/slides/slide14.xml><?xml version="1.0" encoding="utf-8"?>
+<file path=ppt/slides/slide17.xml><?xml version="1.0" encoding="utf-8"?>
 <p:sld xmlns:a="http://schemas.openxmlformats.org/drawingml/2006/main" xmlns:r="http://schemas.openxmlformats.org/officeDocument/2006/relationships" xmlns:p="http://schemas.openxmlformats.org/presentationml/2006/main">
   <p:cSld>
     <p:spTree>
@@ -14934,7 +15333,7 @@
           <a:p>
             <a:r>
               <a:rPr lang="en-US" dirty="0"/>
-              <a:t>Thank you…</a:t>
+              <a:t>Thank you slide</a:t>
             </a:r>
           </a:p>
         </p:txBody>
@@ -15023,6 +15422,132 @@
   <p:cSld>
     <p:spTree>
       <p:nvGrpSpPr>
+        <p:cNvPr id="1" name="">
+          <a:extLst>
+            <a:ext uri="{FF2B5EF4-FFF2-40B4-BE49-F238E27FC236}">
+              <a16:creationId xmlns:a16="http://schemas.microsoft.com/office/drawing/2014/main" id="{EE80BA79-2B5E-2FE0-E594-F46EE435C45D}"/>
+            </a:ext>
+          </a:extLst>
+        </p:cNvPr>
+        <p:cNvGrpSpPr/>
+        <p:nvPr/>
+      </p:nvGrpSpPr>
+      <p:grpSpPr>
+        <a:xfrm>
+          <a:off x="0" y="0"/>
+          <a:ext cx="0" cy="0"/>
+          <a:chOff x="0" y="0"/>
+          <a:chExt cx="0" cy="0"/>
+        </a:xfrm>
+      </p:grpSpPr>
+      <p:sp>
+        <p:nvSpPr>
+          <p:cNvPr id="2" name="Picture Placeholder 1">
+            <a:extLst>
+              <a:ext uri="{FF2B5EF4-FFF2-40B4-BE49-F238E27FC236}">
+                <a16:creationId xmlns:a16="http://schemas.microsoft.com/office/drawing/2014/main" id="{938CF89B-66A7-316D-EEF5-2FE5FDFB2053}"/>
+              </a:ext>
+            </a:extLst>
+          </p:cNvPr>
+          <p:cNvSpPr>
+            <a:spLocks noGrp="1"/>
+          </p:cNvSpPr>
+          <p:nvPr>
+            <p:ph type="pic" sz="quarter" idx="13"/>
+          </p:nvPr>
+        </p:nvSpPr>
+        <p:spPr/>
+        <p:txBody>
+          <a:bodyPr/>
+          <a:lstStyle/>
+          <a:p>
+            <a:endParaRPr lang="en-US"/>
+          </a:p>
+        </p:txBody>
+      </p:sp>
+      <p:sp>
+        <p:nvSpPr>
+          <p:cNvPr id="3" name="Title 2">
+            <a:extLst>
+              <a:ext uri="{FF2B5EF4-FFF2-40B4-BE49-F238E27FC236}">
+                <a16:creationId xmlns:a16="http://schemas.microsoft.com/office/drawing/2014/main" id="{BD1BF7E9-356D-3DF7-09A0-AE428BFC72ED}"/>
+              </a:ext>
+            </a:extLst>
+          </p:cNvPr>
+          <p:cNvSpPr>
+            <a:spLocks noGrp="1"/>
+          </p:cNvSpPr>
+          <p:nvPr>
+            <p:ph type="ctrTitle"/>
+          </p:nvPr>
+        </p:nvSpPr>
+        <p:spPr/>
+        <p:txBody>
+          <a:bodyPr/>
+          <a:lstStyle/>
+          <a:p>
+            <a:r>
+              <a:rPr lang="en-US" dirty="0"/>
+              <a:t>Summary Part I</a:t>
+            </a:r>
+          </a:p>
+        </p:txBody>
+      </p:sp>
+      <p:sp>
+        <p:nvSpPr>
+          <p:cNvPr id="4" name="Content Placeholder 3">
+            <a:extLst>
+              <a:ext uri="{FF2B5EF4-FFF2-40B4-BE49-F238E27FC236}">
+                <a16:creationId xmlns:a16="http://schemas.microsoft.com/office/drawing/2014/main" id="{090104CC-12C5-DD04-34A0-1B37A1FC20A1}"/>
+              </a:ext>
+            </a:extLst>
+          </p:cNvPr>
+          <p:cNvSpPr>
+            <a:spLocks noGrp="1"/>
+          </p:cNvSpPr>
+          <p:nvPr>
+            <p:ph sz="quarter" idx="14"/>
+          </p:nvPr>
+        </p:nvSpPr>
+        <p:spPr/>
+        <p:txBody>
+          <a:bodyPr/>
+          <a:lstStyle/>
+          <a:p>
+            <a:pPr marL="0" indent="0">
+              <a:buNone/>
+            </a:pPr>
+            <a:r>
+              <a:rPr lang="en-US" dirty="0"/>
+              <a:t>What we had to deliver for part I</a:t>
+            </a:r>
+          </a:p>
+          <a:p>
+            <a:pPr marL="0" indent="0">
+              <a:buNone/>
+            </a:pPr>
+            <a:endParaRPr lang="en-US" dirty="0"/>
+          </a:p>
+        </p:txBody>
+      </p:sp>
+    </p:spTree>
+    <p:extLst>
+      <p:ext uri="{BB962C8B-B14F-4D97-AF65-F5344CB8AC3E}">
+        <p14:creationId xmlns:p14="http://schemas.microsoft.com/office/powerpoint/2010/main" val="1592182168"/>
+      </p:ext>
+    </p:extLst>
+  </p:cSld>
+  <p:clrMapOvr>
+    <a:masterClrMapping/>
+  </p:clrMapOvr>
+</p:sld>
+</file>
+
+<file path=ppt/slides/slide3.xml><?xml version="1.0" encoding="utf-8"?>
+<p:sld xmlns:a="http://schemas.openxmlformats.org/drawingml/2006/main" xmlns:r="http://schemas.openxmlformats.org/officeDocument/2006/relationships" xmlns:p="http://schemas.openxmlformats.org/presentationml/2006/main">
+  <p:cSld>
+    <p:spTree>
+      <p:nvGrpSpPr>
         <p:cNvPr id="1" name=""/>
         <p:cNvGrpSpPr/>
         <p:nvPr/>
@@ -15081,7 +15606,10 @@
           <a:bodyPr/>
           <a:lstStyle/>
           <a:p>
-            <a:endParaRPr lang="en-US"/>
+            <a:r>
+              <a:rPr lang="en-US" dirty="0"/>
+              <a:t>Chinook Data Warehouse</a:t>
+            </a:r>
           </a:p>
         </p:txBody>
       </p:sp>
@@ -15106,7 +15634,13 @@
           <a:bodyPr/>
           <a:lstStyle/>
           <a:p>
-            <a:endParaRPr lang="en-US"/>
+            <a:pPr marL="0" indent="0">
+              <a:buNone/>
+            </a:pPr>
+            <a:r>
+              <a:rPr lang="en-US" dirty="0"/>
+              <a:t>SQL script video pre-recorded and deliverables</a:t>
+            </a:r>
           </a:p>
         </p:txBody>
       </p:sp>
@@ -15123,7 +15657,7 @@
 </p:sld>
 </file>
 
-<file path=ppt/slides/slide3.xml><?xml version="1.0" encoding="utf-8"?>
+<file path=ppt/slides/slide4.xml><?xml version="1.0" encoding="utf-8"?>
 <p:sld xmlns:a="http://schemas.openxmlformats.org/drawingml/2006/main" xmlns:r="http://schemas.openxmlformats.org/officeDocument/2006/relationships" xmlns:p="http://schemas.openxmlformats.org/presentationml/2006/main">
   <p:cSld>
     <p:spTree>
@@ -15167,7 +15701,7 @@
           <a:bodyPr/>
           <a:lstStyle/>
           <a:p>
-            <a:endParaRPr lang="en-US"/>
+            <a:endParaRPr lang="en-US" dirty="0"/>
           </a:p>
         </p:txBody>
       </p:sp>
@@ -15192,7 +15726,10 @@
           <a:bodyPr/>
           <a:lstStyle/>
           <a:p>
-            <a:endParaRPr lang="en-US"/>
+            <a:r>
+              <a:rPr lang="en-US" dirty="0"/>
+              <a:t>Chinook Data Warehouse</a:t>
+            </a:r>
           </a:p>
         </p:txBody>
       </p:sp>
@@ -15217,7 +15754,22 @@
           <a:bodyPr/>
           <a:lstStyle/>
           <a:p>
-            <a:endParaRPr lang="en-US"/>
+            <a:pPr marL="0" indent="0">
+              <a:buNone/>
+            </a:pPr>
+            <a:r>
+              <a:rPr lang="en-US" dirty="0"/>
+              <a:t>describing how we made the script and comments. </a:t>
+            </a:r>
+          </a:p>
+          <a:p>
+            <a:pPr marL="0" indent="0">
+              <a:buNone/>
+            </a:pPr>
+            <a:r>
+              <a:rPr lang="en-US" dirty="0"/>
+              <a:t>Photo of the Database schema (Star)</a:t>
+            </a:r>
           </a:p>
         </p:txBody>
       </p:sp>
@@ -15234,7 +15786,7 @@
 </p:sld>
 </file>
 
-<file path=ppt/slides/slide4.xml><?xml version="1.0" encoding="utf-8"?>
+<file path=ppt/slides/slide5.xml><?xml version="1.0" encoding="utf-8"?>
 <p:sld xmlns:a="http://schemas.openxmlformats.org/drawingml/2006/main" xmlns:r="http://schemas.openxmlformats.org/officeDocument/2006/relationships" xmlns:p="http://schemas.openxmlformats.org/presentationml/2006/main">
   <p:cSld>
     <p:spTree>
@@ -15303,7 +15855,10 @@
           <a:bodyPr/>
           <a:lstStyle/>
           <a:p>
-            <a:endParaRPr lang="en-US"/>
+            <a:r>
+              <a:rPr lang="en-US" dirty="0"/>
+              <a:t>Power BI</a:t>
+            </a:r>
           </a:p>
         </p:txBody>
       </p:sp>
@@ -15328,7 +15883,13 @@
           <a:bodyPr/>
           <a:lstStyle/>
           <a:p>
-            <a:endParaRPr lang="en-US"/>
+            <a:pPr marL="0" indent="0">
+              <a:buNone/>
+            </a:pPr>
+            <a:r>
+              <a:rPr lang="en-US" dirty="0"/>
+              <a:t>Photo of a dashboard and comments on the analysis</a:t>
+            </a:r>
           </a:p>
         </p:txBody>
       </p:sp>
@@ -15336,117 +15897,6 @@
     <p:extLst>
       <p:ext uri="{BB962C8B-B14F-4D97-AF65-F5344CB8AC3E}">
         <p14:creationId xmlns:p14="http://schemas.microsoft.com/office/powerpoint/2010/main" val="1071834621"/>
-      </p:ext>
-    </p:extLst>
-  </p:cSld>
-  <p:clrMapOvr>
-    <a:masterClrMapping/>
-  </p:clrMapOvr>
-</p:sld>
-</file>
-
-<file path=ppt/slides/slide5.xml><?xml version="1.0" encoding="utf-8"?>
-<p:sld xmlns:a="http://schemas.openxmlformats.org/drawingml/2006/main" xmlns:r="http://schemas.openxmlformats.org/officeDocument/2006/relationships" xmlns:p="http://schemas.openxmlformats.org/presentationml/2006/main">
-  <p:cSld>
-    <p:spTree>
-      <p:nvGrpSpPr>
-        <p:cNvPr id="1" name="">
-          <a:extLst>
-            <a:ext uri="{FF2B5EF4-FFF2-40B4-BE49-F238E27FC236}">
-              <a16:creationId xmlns:a16="http://schemas.microsoft.com/office/drawing/2014/main" id="{03B9CC11-42FF-9B12-A441-475AE56C780D}"/>
-            </a:ext>
-          </a:extLst>
-        </p:cNvPr>
-        <p:cNvGrpSpPr/>
-        <p:nvPr/>
-      </p:nvGrpSpPr>
-      <p:grpSpPr>
-        <a:xfrm>
-          <a:off x="0" y="0"/>
-          <a:ext cx="0" cy="0"/>
-          <a:chOff x="0" y="0"/>
-          <a:chExt cx="0" cy="0"/>
-        </a:xfrm>
-      </p:grpSpPr>
-      <p:sp>
-        <p:nvSpPr>
-          <p:cNvPr id="2" name="Picture Placeholder 1">
-            <a:extLst>
-              <a:ext uri="{FF2B5EF4-FFF2-40B4-BE49-F238E27FC236}">
-                <a16:creationId xmlns:a16="http://schemas.microsoft.com/office/drawing/2014/main" id="{A2B8389E-7556-2C0A-0512-7CF8ED025F80}"/>
-              </a:ext>
-            </a:extLst>
-          </p:cNvPr>
-          <p:cNvSpPr>
-            <a:spLocks noGrp="1"/>
-          </p:cNvSpPr>
-          <p:nvPr>
-            <p:ph type="pic" sz="quarter" idx="13"/>
-          </p:nvPr>
-        </p:nvSpPr>
-        <p:spPr/>
-        <p:txBody>
-          <a:bodyPr/>
-          <a:lstStyle/>
-          <a:p>
-            <a:endParaRPr lang="en-US"/>
-          </a:p>
-        </p:txBody>
-      </p:sp>
-      <p:sp>
-        <p:nvSpPr>
-          <p:cNvPr id="3" name="Title 2">
-            <a:extLst>
-              <a:ext uri="{FF2B5EF4-FFF2-40B4-BE49-F238E27FC236}">
-                <a16:creationId xmlns:a16="http://schemas.microsoft.com/office/drawing/2014/main" id="{A05DC4E3-D54C-3218-91D7-F5526DEB8BCA}"/>
-              </a:ext>
-            </a:extLst>
-          </p:cNvPr>
-          <p:cNvSpPr>
-            <a:spLocks noGrp="1"/>
-          </p:cNvSpPr>
-          <p:nvPr>
-            <p:ph type="ctrTitle"/>
-          </p:nvPr>
-        </p:nvSpPr>
-        <p:spPr/>
-        <p:txBody>
-          <a:bodyPr/>
-          <a:lstStyle/>
-          <a:p>
-            <a:endParaRPr lang="en-US"/>
-          </a:p>
-        </p:txBody>
-      </p:sp>
-      <p:sp>
-        <p:nvSpPr>
-          <p:cNvPr id="4" name="Content Placeholder 3">
-            <a:extLst>
-              <a:ext uri="{FF2B5EF4-FFF2-40B4-BE49-F238E27FC236}">
-                <a16:creationId xmlns:a16="http://schemas.microsoft.com/office/drawing/2014/main" id="{AA5FC8C2-9B95-0D16-5FB8-E0A9D1C0CD2F}"/>
-              </a:ext>
-            </a:extLst>
-          </p:cNvPr>
-          <p:cNvSpPr>
-            <a:spLocks noGrp="1"/>
-          </p:cNvSpPr>
-          <p:nvPr>
-            <p:ph sz="quarter" idx="14"/>
-          </p:nvPr>
-        </p:nvSpPr>
-        <p:spPr/>
-        <p:txBody>
-          <a:bodyPr/>
-          <a:lstStyle/>
-          <a:p>
-            <a:endParaRPr lang="en-US"/>
-          </a:p>
-        </p:txBody>
-      </p:sp>
-    </p:spTree>
-    <p:extLst>
-      <p:ext uri="{BB962C8B-B14F-4D97-AF65-F5344CB8AC3E}">
-        <p14:creationId xmlns:p14="http://schemas.microsoft.com/office/powerpoint/2010/main" val="2363641367"/>
       </p:ext>
     </p:extLst>
   </p:cSld>
@@ -15464,7 +15914,7 @@
         <p:cNvPr id="1" name="">
           <a:extLst>
             <a:ext uri="{FF2B5EF4-FFF2-40B4-BE49-F238E27FC236}">
-              <a16:creationId xmlns:a16="http://schemas.microsoft.com/office/drawing/2014/main" id="{7EC8CBD1-15AA-AB84-F147-58779A75B5C2}"/>
+              <a16:creationId xmlns:a16="http://schemas.microsoft.com/office/drawing/2014/main" id="{74B8F4C7-4A30-8E5E-084A-E5FD69B73E91}"/>
             </a:ext>
           </a:extLst>
         </p:cNvPr>
@@ -15484,7 +15934,7 @@
           <p:cNvPr id="2" name="Picture Placeholder 1">
             <a:extLst>
               <a:ext uri="{FF2B5EF4-FFF2-40B4-BE49-F238E27FC236}">
-                <a16:creationId xmlns:a16="http://schemas.microsoft.com/office/drawing/2014/main" id="{B7F3E402-4F46-86A0-0C41-8164AF066054}"/>
+                <a16:creationId xmlns:a16="http://schemas.microsoft.com/office/drawing/2014/main" id="{7BE88E1E-5D98-41C0-9FA0-26ABE6701440}"/>
               </a:ext>
             </a:extLst>
           </p:cNvPr>
@@ -15509,7 +15959,7 @@
           <p:cNvPr id="3" name="Title 2">
             <a:extLst>
               <a:ext uri="{FF2B5EF4-FFF2-40B4-BE49-F238E27FC236}">
-                <a16:creationId xmlns:a16="http://schemas.microsoft.com/office/drawing/2014/main" id="{245567B9-FF87-2033-8673-879CD30E4526}"/>
+                <a16:creationId xmlns:a16="http://schemas.microsoft.com/office/drawing/2014/main" id="{3E726368-37AB-C5C0-224B-3A4CA6A8B66B}"/>
               </a:ext>
             </a:extLst>
           </p:cNvPr>
@@ -15525,7 +15975,10 @@
           <a:bodyPr/>
           <a:lstStyle/>
           <a:p>
-            <a:endParaRPr lang="en-US"/>
+            <a:r>
+              <a:rPr lang="en-US" dirty="0"/>
+              <a:t>Power BI</a:t>
+            </a:r>
           </a:p>
         </p:txBody>
       </p:sp>
@@ -15534,7 +15987,7 @@
           <p:cNvPr id="4" name="Content Placeholder 3">
             <a:extLst>
               <a:ext uri="{FF2B5EF4-FFF2-40B4-BE49-F238E27FC236}">
-                <a16:creationId xmlns:a16="http://schemas.microsoft.com/office/drawing/2014/main" id="{0F917385-8B1C-3EF6-8124-20BD40B56F2D}"/>
+                <a16:creationId xmlns:a16="http://schemas.microsoft.com/office/drawing/2014/main" id="{554E4C21-12DB-D89D-AA10-653FBA723C95}"/>
               </a:ext>
             </a:extLst>
           </p:cNvPr>
@@ -15550,14 +16003,20 @@
           <a:bodyPr/>
           <a:lstStyle/>
           <a:p>
-            <a:endParaRPr lang="en-US"/>
+            <a:pPr marL="0" indent="0">
+              <a:buNone/>
+            </a:pPr>
+            <a:r>
+              <a:rPr lang="en-US" dirty="0"/>
+              <a:t>Photo of a dashboard and comments on the analysis</a:t>
+            </a:r>
           </a:p>
         </p:txBody>
       </p:sp>
     </p:spTree>
     <p:extLst>
       <p:ext uri="{BB962C8B-B14F-4D97-AF65-F5344CB8AC3E}">
-        <p14:creationId xmlns:p14="http://schemas.microsoft.com/office/powerpoint/2010/main" val="2704224281"/>
+        <p14:creationId xmlns:p14="http://schemas.microsoft.com/office/powerpoint/2010/main" val="2479289069"/>
       </p:ext>
     </p:extLst>
   </p:cSld>
@@ -15575,7 +16034,7 @@
         <p:cNvPr id="1" name="">
           <a:extLst>
             <a:ext uri="{FF2B5EF4-FFF2-40B4-BE49-F238E27FC236}">
-              <a16:creationId xmlns:a16="http://schemas.microsoft.com/office/drawing/2014/main" id="{3DF59C08-CB37-C23D-291B-72E8E95271E0}"/>
+              <a16:creationId xmlns:a16="http://schemas.microsoft.com/office/drawing/2014/main" id="{6D8B738A-84C6-EFC2-EE01-4B828FF7CB90}"/>
             </a:ext>
           </a:extLst>
         </p:cNvPr>
@@ -15595,7 +16054,7 @@
           <p:cNvPr id="2" name="Picture Placeholder 1">
             <a:extLst>
               <a:ext uri="{FF2B5EF4-FFF2-40B4-BE49-F238E27FC236}">
-                <a16:creationId xmlns:a16="http://schemas.microsoft.com/office/drawing/2014/main" id="{A63826C5-2438-9B11-841D-64DB4E3D7C3B}"/>
+                <a16:creationId xmlns:a16="http://schemas.microsoft.com/office/drawing/2014/main" id="{92A9E985-4A5E-97CC-EECB-EBE55346A928}"/>
               </a:ext>
             </a:extLst>
           </p:cNvPr>
@@ -15620,7 +16079,7 @@
           <p:cNvPr id="3" name="Title 2">
             <a:extLst>
               <a:ext uri="{FF2B5EF4-FFF2-40B4-BE49-F238E27FC236}">
-                <a16:creationId xmlns:a16="http://schemas.microsoft.com/office/drawing/2014/main" id="{61B0E419-6AC5-99B2-2675-EFBEB60A1FED}"/>
+                <a16:creationId xmlns:a16="http://schemas.microsoft.com/office/drawing/2014/main" id="{6410CD16-D13C-2D30-AB4E-F39D629E4EFC}"/>
               </a:ext>
             </a:extLst>
           </p:cNvPr>
@@ -15636,7 +16095,10 @@
           <a:bodyPr/>
           <a:lstStyle/>
           <a:p>
-            <a:endParaRPr lang="en-US"/>
+            <a:r>
+              <a:rPr lang="en-US" dirty="0"/>
+              <a:t>Power BI</a:t>
+            </a:r>
           </a:p>
         </p:txBody>
       </p:sp>
@@ -15645,7 +16107,7 @@
           <p:cNvPr id="4" name="Content Placeholder 3">
             <a:extLst>
               <a:ext uri="{FF2B5EF4-FFF2-40B4-BE49-F238E27FC236}">
-                <a16:creationId xmlns:a16="http://schemas.microsoft.com/office/drawing/2014/main" id="{470E2E1A-7781-0173-3C19-1C476D434732}"/>
+                <a16:creationId xmlns:a16="http://schemas.microsoft.com/office/drawing/2014/main" id="{241E0303-5349-C026-F119-89CA372EFDFB}"/>
               </a:ext>
             </a:extLst>
           </p:cNvPr>
@@ -15661,14 +16123,20 @@
           <a:bodyPr/>
           <a:lstStyle/>
           <a:p>
-            <a:endParaRPr lang="en-US"/>
+            <a:pPr marL="0" indent="0">
+              <a:buNone/>
+            </a:pPr>
+            <a:r>
+              <a:rPr lang="en-US" dirty="0"/>
+              <a:t>Photo of a dashboard and comments on the analysis</a:t>
+            </a:r>
           </a:p>
         </p:txBody>
       </p:sp>
     </p:spTree>
     <p:extLst>
       <p:ext uri="{BB962C8B-B14F-4D97-AF65-F5344CB8AC3E}">
-        <p14:creationId xmlns:p14="http://schemas.microsoft.com/office/powerpoint/2010/main" val="863411072"/>
+        <p14:creationId xmlns:p14="http://schemas.microsoft.com/office/powerpoint/2010/main" val="29665946"/>
       </p:ext>
     </p:extLst>
   </p:cSld>
@@ -15686,7 +16154,7 @@
         <p:cNvPr id="1" name="">
           <a:extLst>
             <a:ext uri="{FF2B5EF4-FFF2-40B4-BE49-F238E27FC236}">
-              <a16:creationId xmlns:a16="http://schemas.microsoft.com/office/drawing/2014/main" id="{16F831C0-3127-B5ED-D9DC-71B6D85DCC03}"/>
+              <a16:creationId xmlns:a16="http://schemas.microsoft.com/office/drawing/2014/main" id="{A11A7B72-E98A-CC88-5B64-82E8DE9CEBFF}"/>
             </a:ext>
           </a:extLst>
         </p:cNvPr>
@@ -15706,7 +16174,7 @@
           <p:cNvPr id="2" name="Picture Placeholder 1">
             <a:extLst>
               <a:ext uri="{FF2B5EF4-FFF2-40B4-BE49-F238E27FC236}">
-                <a16:creationId xmlns:a16="http://schemas.microsoft.com/office/drawing/2014/main" id="{C9C88D03-6CE7-86BD-5F23-2887158399D7}"/>
+                <a16:creationId xmlns:a16="http://schemas.microsoft.com/office/drawing/2014/main" id="{D7EEACB1-24C5-4E1F-6CF4-48D41F011BD9}"/>
               </a:ext>
             </a:extLst>
           </p:cNvPr>
@@ -15731,7 +16199,7 @@
           <p:cNvPr id="3" name="Title 2">
             <a:extLst>
               <a:ext uri="{FF2B5EF4-FFF2-40B4-BE49-F238E27FC236}">
-                <a16:creationId xmlns:a16="http://schemas.microsoft.com/office/drawing/2014/main" id="{515467A6-834B-98C5-22AD-7456757BE2B4}"/>
+                <a16:creationId xmlns:a16="http://schemas.microsoft.com/office/drawing/2014/main" id="{5CF16EC8-0C3C-0276-91DE-7C9D524436C8}"/>
               </a:ext>
             </a:extLst>
           </p:cNvPr>
@@ -15747,7 +16215,10 @@
           <a:bodyPr/>
           <a:lstStyle/>
           <a:p>
-            <a:endParaRPr lang="en-US"/>
+            <a:r>
+              <a:rPr lang="en-US" dirty="0"/>
+              <a:t>Power BI</a:t>
+            </a:r>
           </a:p>
         </p:txBody>
       </p:sp>
@@ -15756,7 +16227,7 @@
           <p:cNvPr id="4" name="Content Placeholder 3">
             <a:extLst>
               <a:ext uri="{FF2B5EF4-FFF2-40B4-BE49-F238E27FC236}">
-                <a16:creationId xmlns:a16="http://schemas.microsoft.com/office/drawing/2014/main" id="{54E28D1C-26D3-3776-7DCF-654B02978413}"/>
+                <a16:creationId xmlns:a16="http://schemas.microsoft.com/office/drawing/2014/main" id="{24C82739-AABD-BC54-B3FF-53A49E0D1243}"/>
               </a:ext>
             </a:extLst>
           </p:cNvPr>
@@ -15772,14 +16243,20 @@
           <a:bodyPr/>
           <a:lstStyle/>
           <a:p>
-            <a:endParaRPr lang="en-US"/>
+            <a:pPr marL="0" indent="0">
+              <a:buNone/>
+            </a:pPr>
+            <a:r>
+              <a:rPr lang="en-US" dirty="0"/>
+              <a:t>Photo of a dashboard and comments on the analysis</a:t>
+            </a:r>
           </a:p>
         </p:txBody>
       </p:sp>
     </p:spTree>
     <p:extLst>
       <p:ext uri="{BB962C8B-B14F-4D97-AF65-F5344CB8AC3E}">
-        <p14:creationId xmlns:p14="http://schemas.microsoft.com/office/powerpoint/2010/main" val="4093411706"/>
+        <p14:creationId xmlns:p14="http://schemas.microsoft.com/office/powerpoint/2010/main" val="3430788363"/>
       </p:ext>
     </p:extLst>
   </p:cSld>
@@ -15797,7 +16274,7 @@
         <p:cNvPr id="1" name="">
           <a:extLst>
             <a:ext uri="{FF2B5EF4-FFF2-40B4-BE49-F238E27FC236}">
-              <a16:creationId xmlns:a16="http://schemas.microsoft.com/office/drawing/2014/main" id="{335E279A-7941-B91B-540C-561BB9E4C819}"/>
+              <a16:creationId xmlns:a16="http://schemas.microsoft.com/office/drawing/2014/main" id="{744060E9-9530-C8C5-DC27-B369BC1DFDE5}"/>
             </a:ext>
           </a:extLst>
         </p:cNvPr>
@@ -15817,7 +16294,7 @@
           <p:cNvPr id="2" name="Picture Placeholder 1">
             <a:extLst>
               <a:ext uri="{FF2B5EF4-FFF2-40B4-BE49-F238E27FC236}">
-                <a16:creationId xmlns:a16="http://schemas.microsoft.com/office/drawing/2014/main" id="{A562264E-AD7D-FC16-1F70-59EB446DFC7A}"/>
+                <a16:creationId xmlns:a16="http://schemas.microsoft.com/office/drawing/2014/main" id="{89FEE615-B42A-EF1E-7BF2-C1B2F3959AB7}"/>
               </a:ext>
             </a:extLst>
           </p:cNvPr>
@@ -15842,7 +16319,7 @@
           <p:cNvPr id="3" name="Title 2">
             <a:extLst>
               <a:ext uri="{FF2B5EF4-FFF2-40B4-BE49-F238E27FC236}">
-                <a16:creationId xmlns:a16="http://schemas.microsoft.com/office/drawing/2014/main" id="{47EF97E6-1A26-B712-EA2D-F6137210414C}"/>
+                <a16:creationId xmlns:a16="http://schemas.microsoft.com/office/drawing/2014/main" id="{068A4578-6715-3749-27CD-22E875F7E275}"/>
               </a:ext>
             </a:extLst>
           </p:cNvPr>
@@ -15858,7 +16335,10 @@
           <a:bodyPr/>
           <a:lstStyle/>
           <a:p>
-            <a:endParaRPr lang="en-US"/>
+            <a:r>
+              <a:rPr lang="en-US" dirty="0"/>
+              <a:t>Summary Part II</a:t>
+            </a:r>
           </a:p>
         </p:txBody>
       </p:sp>
@@ -15867,7 +16347,7 @@
           <p:cNvPr id="4" name="Content Placeholder 3">
             <a:extLst>
               <a:ext uri="{FF2B5EF4-FFF2-40B4-BE49-F238E27FC236}">
-                <a16:creationId xmlns:a16="http://schemas.microsoft.com/office/drawing/2014/main" id="{FABABC53-F01F-59EA-44CC-764FFA49F755}"/>
+                <a16:creationId xmlns:a16="http://schemas.microsoft.com/office/drawing/2014/main" id="{66CCE016-76CD-02BC-6922-E0DFB5E2209B}"/>
               </a:ext>
             </a:extLst>
           </p:cNvPr>
@@ -15883,14 +16363,26 @@
           <a:bodyPr/>
           <a:lstStyle/>
           <a:p>
-            <a:endParaRPr lang="en-US"/>
+            <a:pPr marL="0" indent="0">
+              <a:buNone/>
+            </a:pPr>
+            <a:r>
+              <a:rPr lang="en-US" dirty="0"/>
+              <a:t>What we had to deliver for part II</a:t>
+            </a:r>
+          </a:p>
+          <a:p>
+            <a:pPr marL="0" indent="0">
+              <a:buNone/>
+            </a:pPr>
+            <a:endParaRPr lang="en-US" dirty="0"/>
           </a:p>
         </p:txBody>
       </p:sp>
     </p:spTree>
     <p:extLst>
       <p:ext uri="{BB962C8B-B14F-4D97-AF65-F5344CB8AC3E}">
-        <p14:creationId xmlns:p14="http://schemas.microsoft.com/office/powerpoint/2010/main" val="3876590593"/>
+        <p14:creationId xmlns:p14="http://schemas.microsoft.com/office/powerpoint/2010/main" val="3552034850"/>
       </p:ext>
     </p:extLst>
   </p:cSld>

</xml_diff>